<commit_message>
Changes in documentation done
</commit_message>
<xml_diff>
--- a/g3_device_udp_wbz451h/doc/WBZ451H_XPRO1.pptx
+++ b/g3_device_udp_wbz451h/doc/WBZ451H_XPRO1.pptx
@@ -633,7 +633,7 @@
           <a:p>
             <a:fld id="{B6272C8B-44A4-4CB6-A7A0-AE8976D0A5E6}" type="datetimeFigureOut">
               <a:rPr lang="de-DE" smtClean="0"/>
-              <a:t>04.08.2025</a:t>
+              <a:t>06.08.2025</a:t>
             </a:fld>
             <a:endParaRPr lang="de-DE"/>
           </a:p>
@@ -833,7 +833,7 @@
           <a:p>
             <a:fld id="{B6272C8B-44A4-4CB6-A7A0-AE8976D0A5E6}" type="datetimeFigureOut">
               <a:rPr lang="de-DE" smtClean="0"/>
-              <a:t>04.08.2025</a:t>
+              <a:t>06.08.2025</a:t>
             </a:fld>
             <a:endParaRPr lang="de-DE"/>
           </a:p>
@@ -1043,7 +1043,7 @@
           <a:p>
             <a:fld id="{B6272C8B-44A4-4CB6-A7A0-AE8976D0A5E6}" type="datetimeFigureOut">
               <a:rPr lang="de-DE" smtClean="0"/>
-              <a:t>04.08.2025</a:t>
+              <a:t>06.08.2025</a:t>
             </a:fld>
             <a:endParaRPr lang="de-DE"/>
           </a:p>
@@ -1243,7 +1243,7 @@
           <a:p>
             <a:fld id="{B6272C8B-44A4-4CB6-A7A0-AE8976D0A5E6}" type="datetimeFigureOut">
               <a:rPr lang="de-DE" smtClean="0"/>
-              <a:t>04.08.2025</a:t>
+              <a:t>06.08.2025</a:t>
             </a:fld>
             <a:endParaRPr lang="de-DE"/>
           </a:p>
@@ -1519,7 +1519,7 @@
           <a:p>
             <a:fld id="{B6272C8B-44A4-4CB6-A7A0-AE8976D0A5E6}" type="datetimeFigureOut">
               <a:rPr lang="de-DE" smtClean="0"/>
-              <a:t>04.08.2025</a:t>
+              <a:t>06.08.2025</a:t>
             </a:fld>
             <a:endParaRPr lang="de-DE"/>
           </a:p>
@@ -1787,7 +1787,7 @@
           <a:p>
             <a:fld id="{B6272C8B-44A4-4CB6-A7A0-AE8976D0A5E6}" type="datetimeFigureOut">
               <a:rPr lang="de-DE" smtClean="0"/>
-              <a:t>04.08.2025</a:t>
+              <a:t>06.08.2025</a:t>
             </a:fld>
             <a:endParaRPr lang="de-DE"/>
           </a:p>
@@ -2202,7 +2202,7 @@
           <a:p>
             <a:fld id="{B6272C8B-44A4-4CB6-A7A0-AE8976D0A5E6}" type="datetimeFigureOut">
               <a:rPr lang="de-DE" smtClean="0"/>
-              <a:t>04.08.2025</a:t>
+              <a:t>06.08.2025</a:t>
             </a:fld>
             <a:endParaRPr lang="de-DE"/>
           </a:p>
@@ -2344,7 +2344,7 @@
           <a:p>
             <a:fld id="{B6272C8B-44A4-4CB6-A7A0-AE8976D0A5E6}" type="datetimeFigureOut">
               <a:rPr lang="de-DE" smtClean="0"/>
-              <a:t>04.08.2025</a:t>
+              <a:t>06.08.2025</a:t>
             </a:fld>
             <a:endParaRPr lang="de-DE"/>
           </a:p>
@@ -2457,7 +2457,7 @@
           <a:p>
             <a:fld id="{B6272C8B-44A4-4CB6-A7A0-AE8976D0A5E6}" type="datetimeFigureOut">
               <a:rPr lang="de-DE" smtClean="0"/>
-              <a:t>04.08.2025</a:t>
+              <a:t>06.08.2025</a:t>
             </a:fld>
             <a:endParaRPr lang="de-DE"/>
           </a:p>
@@ -2770,7 +2770,7 @@
           <a:p>
             <a:fld id="{B6272C8B-44A4-4CB6-A7A0-AE8976D0A5E6}" type="datetimeFigureOut">
               <a:rPr lang="de-DE" smtClean="0"/>
-              <a:t>04.08.2025</a:t>
+              <a:t>06.08.2025</a:t>
             </a:fld>
             <a:endParaRPr lang="de-DE"/>
           </a:p>
@@ -3059,7 +3059,7 @@
           <a:p>
             <a:fld id="{B6272C8B-44A4-4CB6-A7A0-AE8976D0A5E6}" type="datetimeFigureOut">
               <a:rPr lang="de-DE" smtClean="0"/>
-              <a:t>04.08.2025</a:t>
+              <a:t>06.08.2025</a:t>
             </a:fld>
             <a:endParaRPr lang="de-DE"/>
           </a:p>
@@ -3302,7 +3302,7 @@
           <a:p>
             <a:fld id="{B6272C8B-44A4-4CB6-A7A0-AE8976D0A5E6}" type="datetimeFigureOut">
               <a:rPr lang="de-DE" smtClean="0"/>
-              <a:t>04.08.2025</a:t>
+              <a:t>06.08.2025</a:t>
             </a:fld>
             <a:endParaRPr lang="de-DE"/>
           </a:p>
@@ -3894,7 +3894,7 @@
         </p:blipFill>
         <p:spPr bwMode="auto">
           <a:xfrm>
-            <a:off x="1240972" y="0"/>
+            <a:off x="669472" y="61912"/>
             <a:ext cx="10696575" cy="7553325"/>
           </a:xfrm>
           <a:prstGeom prst="rect">
@@ -3926,8 +3926,8 @@
         </p:nvSpPr>
         <p:spPr>
           <a:xfrm>
-            <a:off x="7152488" y="3676528"/>
-            <a:ext cx="184484" cy="269830"/>
+            <a:off x="6801852" y="3512676"/>
+            <a:ext cx="535119" cy="553998"/>
           </a:xfrm>
           <a:prstGeom prst="rect">
             <a:avLst/>
@@ -4193,8 +4193,8 @@
         </p:nvSpPr>
         <p:spPr>
           <a:xfrm>
-            <a:off x="6524842" y="6122569"/>
-            <a:ext cx="1742572" cy="553998"/>
+            <a:off x="6524841" y="6122569"/>
+            <a:ext cx="1889239" cy="553998"/>
           </a:xfrm>
           <a:prstGeom prst="rect">
             <a:avLst/>
@@ -4212,7 +4212,7 @@
                 <a:latin typeface="Arial" panose="020B0604020202020204" pitchFamily="34" charset="0"/>
                 <a:cs typeface="Arial" panose="020B0604020202020204" pitchFamily="34" charset="0"/>
               </a:rPr>
-              <a:t>Remove R4 </a:t>
+              <a:t>Remove R1, R2, R4 </a:t>
             </a:r>
             <a:br>
               <a:rPr lang="de-DE" sz="1000" dirty="0">
@@ -4225,7 +4225,7 @@
                 <a:latin typeface="Arial" panose="020B0604020202020204" pitchFamily="34" charset="0"/>
                 <a:cs typeface="Arial" panose="020B0604020202020204" pitchFamily="34" charset="0"/>
               </a:rPr>
-              <a:t>to disable RTS from UART Virtual Comm Port</a:t>
+              <a:t>to disable RX, TX, RTS from UART Virtual Comm Port</a:t>
             </a:r>
           </a:p>
         </p:txBody>
@@ -4837,14 +4837,14 @@
           <p:nvPr>
             <p:extLst>
               <p:ext uri="{D42A27DB-BD31-4B8C-83A1-F6EECF244321}">
-                <p14:modId xmlns:p14="http://schemas.microsoft.com/office/powerpoint/2010/main" val="3508389693"/>
+                <p14:modId xmlns:p14="http://schemas.microsoft.com/office/powerpoint/2010/main" val="2910037755"/>
               </p:ext>
             </p:extLst>
           </p:nvPr>
         </p:nvGraphicFramePr>
         <p:xfrm>
           <a:off x="3293707" y="330462"/>
-          <a:ext cx="6288832" cy="6337238"/>
+          <a:ext cx="6467914" cy="6337238"/>
         </p:xfrm>
         <a:graphic>
           <a:graphicData uri="http://schemas.openxmlformats.org/drawingml/2006/table">
@@ -4853,28 +4853,28 @@
                 <a:tableStyleId>{5C22544A-7EE6-4342-B048-85BDC9FD1C3A}</a:tableStyleId>
               </a:tblPr>
               <a:tblGrid>
-                <a:gridCol w="642857">
+                <a:gridCol w="661163">
                   <a:extLst>
                     <a:ext uri="{9D8B030D-6E8A-4147-A177-3AD203B41FA5}">
                       <a16:colId xmlns:a16="http://schemas.microsoft.com/office/drawing/2014/main" val="358266889"/>
                     </a:ext>
                   </a:extLst>
                 </a:gridCol>
-                <a:gridCol w="2091012">
+                <a:gridCol w="2150556">
                   <a:extLst>
                     <a:ext uri="{9D8B030D-6E8A-4147-A177-3AD203B41FA5}">
                       <a16:colId xmlns:a16="http://schemas.microsoft.com/office/drawing/2014/main" val="2918861483"/>
                     </a:ext>
                   </a:extLst>
                 </a:gridCol>
-                <a:gridCol w="1455575">
+                <a:gridCol w="1497024">
                   <a:extLst>
                     <a:ext uri="{9D8B030D-6E8A-4147-A177-3AD203B41FA5}">
                       <a16:colId xmlns:a16="http://schemas.microsoft.com/office/drawing/2014/main" val="1025640648"/>
                     </a:ext>
                   </a:extLst>
                 </a:gridCol>
-                <a:gridCol w="2099388">
+                <a:gridCol w="2159171">
                   <a:extLst>
                     <a:ext uri="{9D8B030D-6E8A-4147-A177-3AD203B41FA5}">
                       <a16:colId xmlns:a16="http://schemas.microsoft.com/office/drawing/2014/main" val="3343854038"/>
@@ -5979,7 +5979,7 @@
                             <a:schemeClr val="tx1"/>
                           </a:solidFill>
                         </a:rPr>
-                        <a:t>not connected</a:t>
+                        <a:t>not connected – used as console RX</a:t>
                       </a:r>
                     </a:p>
                   </a:txBody>
@@ -6046,7 +6046,7 @@
                     <a:p>
                       <a:r>
                         <a:rPr lang="de-DE" sz="1000" dirty="0"/>
-                        <a:t>not connected</a:t>
+                        <a:t>not connected – used as console TX</a:t>
                       </a:r>
                     </a:p>
                   </a:txBody>

</xml_diff>

<commit_message>
Include protomatter library from Adafruit
</commit_message>
<xml_diff>
--- a/g3_device_udp_wbz451h/doc/WBZ451H_XPRO1.pptx
+++ b/g3_device_udp_wbz451h/doc/WBZ451H_XPRO1.pptx
@@ -633,7 +633,7 @@
           <a:p>
             <a:fld id="{B6272C8B-44A4-4CB6-A7A0-AE8976D0A5E6}" type="datetimeFigureOut">
               <a:rPr lang="de-DE" smtClean="0"/>
-              <a:t>06.08.2025</a:t>
+              <a:t>23.09.2025</a:t>
             </a:fld>
             <a:endParaRPr lang="de-DE"/>
           </a:p>
@@ -833,7 +833,7 @@
           <a:p>
             <a:fld id="{B6272C8B-44A4-4CB6-A7A0-AE8976D0A5E6}" type="datetimeFigureOut">
               <a:rPr lang="de-DE" smtClean="0"/>
-              <a:t>06.08.2025</a:t>
+              <a:t>23.09.2025</a:t>
             </a:fld>
             <a:endParaRPr lang="de-DE"/>
           </a:p>
@@ -1043,7 +1043,7 @@
           <a:p>
             <a:fld id="{B6272C8B-44A4-4CB6-A7A0-AE8976D0A5E6}" type="datetimeFigureOut">
               <a:rPr lang="de-DE" smtClean="0"/>
-              <a:t>06.08.2025</a:t>
+              <a:t>23.09.2025</a:t>
             </a:fld>
             <a:endParaRPr lang="de-DE"/>
           </a:p>
@@ -1243,7 +1243,7 @@
           <a:p>
             <a:fld id="{B6272C8B-44A4-4CB6-A7A0-AE8976D0A5E6}" type="datetimeFigureOut">
               <a:rPr lang="de-DE" smtClean="0"/>
-              <a:t>06.08.2025</a:t>
+              <a:t>23.09.2025</a:t>
             </a:fld>
             <a:endParaRPr lang="de-DE"/>
           </a:p>
@@ -1519,7 +1519,7 @@
           <a:p>
             <a:fld id="{B6272C8B-44A4-4CB6-A7A0-AE8976D0A5E6}" type="datetimeFigureOut">
               <a:rPr lang="de-DE" smtClean="0"/>
-              <a:t>06.08.2025</a:t>
+              <a:t>23.09.2025</a:t>
             </a:fld>
             <a:endParaRPr lang="de-DE"/>
           </a:p>
@@ -1787,7 +1787,7 @@
           <a:p>
             <a:fld id="{B6272C8B-44A4-4CB6-A7A0-AE8976D0A5E6}" type="datetimeFigureOut">
               <a:rPr lang="de-DE" smtClean="0"/>
-              <a:t>06.08.2025</a:t>
+              <a:t>23.09.2025</a:t>
             </a:fld>
             <a:endParaRPr lang="de-DE"/>
           </a:p>
@@ -2202,7 +2202,7 @@
           <a:p>
             <a:fld id="{B6272C8B-44A4-4CB6-A7A0-AE8976D0A5E6}" type="datetimeFigureOut">
               <a:rPr lang="de-DE" smtClean="0"/>
-              <a:t>06.08.2025</a:t>
+              <a:t>23.09.2025</a:t>
             </a:fld>
             <a:endParaRPr lang="de-DE"/>
           </a:p>
@@ -2344,7 +2344,7 @@
           <a:p>
             <a:fld id="{B6272C8B-44A4-4CB6-A7A0-AE8976D0A5E6}" type="datetimeFigureOut">
               <a:rPr lang="de-DE" smtClean="0"/>
-              <a:t>06.08.2025</a:t>
+              <a:t>23.09.2025</a:t>
             </a:fld>
             <a:endParaRPr lang="de-DE"/>
           </a:p>
@@ -2457,7 +2457,7 @@
           <a:p>
             <a:fld id="{B6272C8B-44A4-4CB6-A7A0-AE8976D0A5E6}" type="datetimeFigureOut">
               <a:rPr lang="de-DE" smtClean="0"/>
-              <a:t>06.08.2025</a:t>
+              <a:t>23.09.2025</a:t>
             </a:fld>
             <a:endParaRPr lang="de-DE"/>
           </a:p>
@@ -2770,7 +2770,7 @@
           <a:p>
             <a:fld id="{B6272C8B-44A4-4CB6-A7A0-AE8976D0A5E6}" type="datetimeFigureOut">
               <a:rPr lang="de-DE" smtClean="0"/>
-              <a:t>06.08.2025</a:t>
+              <a:t>23.09.2025</a:t>
             </a:fld>
             <a:endParaRPr lang="de-DE"/>
           </a:p>
@@ -3059,7 +3059,7 @@
           <a:p>
             <a:fld id="{B6272C8B-44A4-4CB6-A7A0-AE8976D0A5E6}" type="datetimeFigureOut">
               <a:rPr lang="de-DE" smtClean="0"/>
-              <a:t>06.08.2025</a:t>
+              <a:t>23.09.2025</a:t>
             </a:fld>
             <a:endParaRPr lang="de-DE"/>
           </a:p>
@@ -3302,7 +3302,7 @@
           <a:p>
             <a:fld id="{B6272C8B-44A4-4CB6-A7A0-AE8976D0A5E6}" type="datetimeFigureOut">
               <a:rPr lang="de-DE" smtClean="0"/>
-              <a:t>06.08.2025</a:t>
+              <a:t>23.09.2025</a:t>
             </a:fld>
             <a:endParaRPr lang="de-DE"/>
           </a:p>
@@ -3926,8 +3926,8 @@
         </p:nvSpPr>
         <p:spPr>
           <a:xfrm>
-            <a:off x="6801852" y="3512676"/>
-            <a:ext cx="535119" cy="553998"/>
+            <a:off x="6585286" y="3360821"/>
+            <a:ext cx="751686" cy="705853"/>
           </a:xfrm>
           <a:prstGeom prst="rect">
             <a:avLst/>
@@ -4024,8 +4024,8 @@
         </p:nvCxnSpPr>
         <p:spPr>
           <a:xfrm flipV="1">
-            <a:off x="2845183" y="4122821"/>
-            <a:ext cx="1251284" cy="368968"/>
+            <a:off x="2845183" y="4143680"/>
+            <a:ext cx="715887" cy="348109"/>
           </a:xfrm>
           <a:prstGeom prst="straightConnector1">
             <a:avLst/>
@@ -4350,7 +4350,7 @@
         </p:nvSpPr>
         <p:spPr>
           <a:xfrm>
-            <a:off x="3847814" y="4908884"/>
+            <a:off x="3305534" y="4950259"/>
             <a:ext cx="320841" cy="260684"/>
           </a:xfrm>
           <a:prstGeom prst="rect">
@@ -4403,9 +4403,9 @@
           <p:nvPr/>
         </p:nvCxnSpPr>
         <p:spPr>
-          <a:xfrm flipV="1">
-            <a:off x="3847814" y="5169568"/>
-            <a:ext cx="152400" cy="953001"/>
+          <a:xfrm flipH="1" flipV="1">
+            <a:off x="3626375" y="5210943"/>
+            <a:ext cx="221439" cy="911626"/>
           </a:xfrm>
           <a:prstGeom prst="straightConnector1">
             <a:avLst/>

</xml_diff>